<commit_message>
Made new figures for Fluence Scan and T0 accuracy in Figures for Paper.py Minor tweaks to exponential_fit.py
</commit_message>
<xml_diff>
--- a/Time-series electron diffraction data analysis.pptx
+++ b/Time-series electron diffraction data analysis.pptx
@@ -270,7 +270,7 @@
           <a:p>
             <a:fld id="{4011A50C-EFD7-4C62-ACE7-DCD416106DB0}" type="datetimeFigureOut">
               <a:rPr lang="en-CA" smtClean="0"/>
-              <a:t>2022-09-14</a:t>
+              <a:t>2022-09-16</a:t>
             </a:fld>
             <a:endParaRPr lang="en-CA"/>
           </a:p>
@@ -470,7 +470,7 @@
           <a:p>
             <a:fld id="{4011A50C-EFD7-4C62-ACE7-DCD416106DB0}" type="datetimeFigureOut">
               <a:rPr lang="en-CA" smtClean="0"/>
-              <a:t>2022-09-14</a:t>
+              <a:t>2022-09-16</a:t>
             </a:fld>
             <a:endParaRPr lang="en-CA"/>
           </a:p>
@@ -680,7 +680,7 @@
           <a:p>
             <a:fld id="{4011A50C-EFD7-4C62-ACE7-DCD416106DB0}" type="datetimeFigureOut">
               <a:rPr lang="en-CA" smtClean="0"/>
-              <a:t>2022-09-14</a:t>
+              <a:t>2022-09-16</a:t>
             </a:fld>
             <a:endParaRPr lang="en-CA"/>
           </a:p>
@@ -880,7 +880,7 @@
           <a:p>
             <a:fld id="{4011A50C-EFD7-4C62-ACE7-DCD416106DB0}" type="datetimeFigureOut">
               <a:rPr lang="en-CA" smtClean="0"/>
-              <a:t>2022-09-14</a:t>
+              <a:t>2022-09-16</a:t>
             </a:fld>
             <a:endParaRPr lang="en-CA"/>
           </a:p>
@@ -1156,7 +1156,7 @@
           <a:p>
             <a:fld id="{4011A50C-EFD7-4C62-ACE7-DCD416106DB0}" type="datetimeFigureOut">
               <a:rPr lang="en-CA" smtClean="0"/>
-              <a:t>2022-09-14</a:t>
+              <a:t>2022-09-16</a:t>
             </a:fld>
             <a:endParaRPr lang="en-CA"/>
           </a:p>
@@ -1424,7 +1424,7 @@
           <a:p>
             <a:fld id="{4011A50C-EFD7-4C62-ACE7-DCD416106DB0}" type="datetimeFigureOut">
               <a:rPr lang="en-CA" smtClean="0"/>
-              <a:t>2022-09-14</a:t>
+              <a:t>2022-09-16</a:t>
             </a:fld>
             <a:endParaRPr lang="en-CA"/>
           </a:p>
@@ -1839,7 +1839,7 @@
           <a:p>
             <a:fld id="{4011A50C-EFD7-4C62-ACE7-DCD416106DB0}" type="datetimeFigureOut">
               <a:rPr lang="en-CA" smtClean="0"/>
-              <a:t>2022-09-14</a:t>
+              <a:t>2022-09-16</a:t>
             </a:fld>
             <a:endParaRPr lang="en-CA"/>
           </a:p>
@@ -1981,7 +1981,7 @@
           <a:p>
             <a:fld id="{4011A50C-EFD7-4C62-ACE7-DCD416106DB0}" type="datetimeFigureOut">
               <a:rPr lang="en-CA" smtClean="0"/>
-              <a:t>2022-09-14</a:t>
+              <a:t>2022-09-16</a:t>
             </a:fld>
             <a:endParaRPr lang="en-CA"/>
           </a:p>
@@ -2094,7 +2094,7 @@
           <a:p>
             <a:fld id="{4011A50C-EFD7-4C62-ACE7-DCD416106DB0}" type="datetimeFigureOut">
               <a:rPr lang="en-CA" smtClean="0"/>
-              <a:t>2022-09-14</a:t>
+              <a:t>2022-09-16</a:t>
             </a:fld>
             <a:endParaRPr lang="en-CA"/>
           </a:p>
@@ -2407,7 +2407,7 @@
           <a:p>
             <a:fld id="{4011A50C-EFD7-4C62-ACE7-DCD416106DB0}" type="datetimeFigureOut">
               <a:rPr lang="en-CA" smtClean="0"/>
-              <a:t>2022-09-14</a:t>
+              <a:t>2022-09-16</a:t>
             </a:fld>
             <a:endParaRPr lang="en-CA"/>
           </a:p>
@@ -2696,7 +2696,7 @@
           <a:p>
             <a:fld id="{4011A50C-EFD7-4C62-ACE7-DCD416106DB0}" type="datetimeFigureOut">
               <a:rPr lang="en-CA" smtClean="0"/>
-              <a:t>2022-09-14</a:t>
+              <a:t>2022-09-16</a:t>
             </a:fld>
             <a:endParaRPr lang="en-CA"/>
           </a:p>
@@ -2939,7 +2939,7 @@
           <a:p>
             <a:fld id="{4011A50C-EFD7-4C62-ACE7-DCD416106DB0}" type="datetimeFigureOut">
               <a:rPr lang="en-CA" smtClean="0"/>
-              <a:t>2022-09-14</a:t>
+              <a:t>2022-09-16</a:t>
             </a:fld>
             <a:endParaRPr lang="en-CA"/>
           </a:p>
@@ -3420,7 +3420,7 @@
           <a:p>
             <a:r>
               <a:rPr lang="en-CA"/>
-              <a:t>Demonstration of data analysis skills</a:t>
+              <a:t>Demonstration of Data Science skills for Ph.D. project</a:t>
             </a:r>
           </a:p>
         </p:txBody>
@@ -6005,8 +6005,8 @@
           </a:p>
         </p:txBody>
       </p:sp>
-      <mc:AlternateContent xmlns:mc="http://schemas.openxmlformats.org/markup-compatibility/2006">
-        <mc:Choice xmlns:a14="http://schemas.microsoft.com/office/drawing/2010/main" Requires="a14">
+      <mc:AlternateContent xmlns:mc="http://schemas.openxmlformats.org/markup-compatibility/2006" xmlns:a14="http://schemas.microsoft.com/office/drawing/2010/main">
+        <mc:Choice Requires="a14">
           <p:graphicFrame>
             <p:nvGraphicFramePr>
               <p:cNvPr id="13" name="Table 12">
@@ -6072,14 +6072,16 @@
                                 <m:r>
                                   <a:rPr lang="en-US" sz="1100">
                                     <a:effectLst/>
+                                    <a:latin typeface="Cambria Math" panose="02040503050406030204" pitchFamily="18" charset="0"/>
                                   </a:rPr>
                                   <m:t>𝐼</m:t>
                                 </m:r>
                                 <m:d>
                                   <m:dPr>
                                     <m:ctrlPr>
-                                      <a:rPr lang="en-CA" sz="1100">
+                                      <a:rPr lang="en-CA" sz="1100" i="1">
                                         <a:effectLst/>
+                                        <a:latin typeface="Cambria Math" panose="02040503050406030204" pitchFamily="18" charset="0"/>
                                       </a:rPr>
                                     </m:ctrlPr>
                                   </m:dPr>
@@ -6087,6 +6089,7 @@
                                     <m:r>
                                       <a:rPr lang="en-US" sz="1100">
                                         <a:effectLst/>
+                                        <a:latin typeface="Cambria Math" panose="02040503050406030204" pitchFamily="18" charset="0"/>
                                       </a:rPr>
                                       <m:t>𝑡</m:t>
                                     </m:r>
@@ -6095,14 +6098,16 @@
                                 <m:r>
                                   <a:rPr lang="en-US" sz="1100">
                                     <a:effectLst/>
+                                    <a:latin typeface="Cambria Math" panose="02040503050406030204" pitchFamily="18" charset="0"/>
                                   </a:rPr>
                                   <m:t>=</m:t>
                                 </m:r>
                                 <m:sSub>
                                   <m:sSubPr>
                                     <m:ctrlPr>
-                                      <a:rPr lang="en-CA" sz="1100">
+                                      <a:rPr lang="en-CA" sz="1100" i="1">
                                         <a:effectLst/>
+                                        <a:latin typeface="Cambria Math" panose="02040503050406030204" pitchFamily="18" charset="0"/>
                                       </a:rPr>
                                     </m:ctrlPr>
                                   </m:sSubPr>
@@ -6110,6 +6115,7 @@
                                     <m:r>
                                       <a:rPr lang="en-US" sz="1100">
                                         <a:effectLst/>
+                                        <a:latin typeface="Cambria Math" panose="02040503050406030204" pitchFamily="18" charset="0"/>
                                       </a:rPr>
                                       <m:t>𝐺</m:t>
                                     </m:r>
@@ -6118,6 +6124,7 @@
                                     <m:r>
                                       <a:rPr lang="en-US" sz="1100">
                                         <a:effectLst/>
+                                        <a:latin typeface="Cambria Math" panose="02040503050406030204" pitchFamily="18" charset="0"/>
                                       </a:rPr>
                                       <m:t>𝜎</m:t>
                                     </m:r>
@@ -6126,8 +6133,9 @@
                                 <m:d>
                                   <m:dPr>
                                     <m:ctrlPr>
-                                      <a:rPr lang="en-CA" sz="1100">
+                                      <a:rPr lang="en-CA" sz="1100" i="1">
                                         <a:effectLst/>
+                                        <a:latin typeface="Cambria Math" panose="02040503050406030204" pitchFamily="18" charset="0"/>
                                       </a:rPr>
                                     </m:ctrlPr>
                                   </m:dPr>
@@ -6135,6 +6143,7 @@
                                     <m:r>
                                       <a:rPr lang="en-US" sz="1100">
                                         <a:effectLst/>
+                                        <a:latin typeface="Cambria Math" panose="02040503050406030204" pitchFamily="18" charset="0"/>
                                       </a:rPr>
                                       <m:t>𝑡</m:t>
                                     </m:r>
@@ -6143,6 +6152,7 @@
                                 <m:r>
                                   <a:rPr lang="en-US" sz="1100">
                                     <a:effectLst/>
+                                    <a:latin typeface="Cambria Math" panose="02040503050406030204" pitchFamily="18" charset="0"/>
                                   </a:rPr>
                                   <m:t>∗</m:t>
                                 </m:r>
@@ -6151,8 +6161,9 @@
                                     <m:begChr m:val="["/>
                                     <m:endChr m:val="]"/>
                                     <m:ctrlPr>
-                                      <a:rPr lang="en-CA" sz="1100">
+                                      <a:rPr lang="en-CA" sz="1100" i="1">
                                         <a:effectLst/>
+                                        <a:latin typeface="Cambria Math" panose="02040503050406030204" pitchFamily="18" charset="0"/>
                                       </a:rPr>
                                     </m:ctrlPr>
                                   </m:dPr>
@@ -6160,8 +6171,9 @@
                                     <m:sSub>
                                       <m:sSubPr>
                                         <m:ctrlPr>
-                                          <a:rPr lang="en-CA" sz="1100">
+                                          <a:rPr lang="en-CA" sz="1100" i="1">
                                             <a:effectLst/>
+                                            <a:latin typeface="Cambria Math" panose="02040503050406030204" pitchFamily="18" charset="0"/>
                                           </a:rPr>
                                         </m:ctrlPr>
                                       </m:sSubPr>
@@ -6169,6 +6181,7 @@
                                         <m:r>
                                           <a:rPr lang="en-US" sz="1100">
                                             <a:effectLst/>
+                                            <a:latin typeface="Cambria Math" panose="02040503050406030204" pitchFamily="18" charset="0"/>
                                           </a:rPr>
                                           <m:t>𝑐</m:t>
                                         </m:r>
@@ -6177,6 +6190,7 @@
                                         <m:r>
                                           <a:rPr lang="en-US" sz="1100">
                                             <a:effectLst/>
+                                            <a:latin typeface="Cambria Math" panose="02040503050406030204" pitchFamily="18" charset="0"/>
                                           </a:rPr>
                                           <m:t>𝑖</m:t>
                                         </m:r>
@@ -6185,8 +6199,9 @@
                                     <m:d>
                                       <m:dPr>
                                         <m:ctrlPr>
-                                          <a:rPr lang="en-CA" sz="1100">
+                                          <a:rPr lang="en-CA" sz="1100" i="1">
                                             <a:effectLst/>
+                                            <a:latin typeface="Cambria Math" panose="02040503050406030204" pitchFamily="18" charset="0"/>
                                           </a:rPr>
                                         </m:ctrlPr>
                                       </m:dPr>
@@ -6194,14 +6209,16 @@
                                         <m:r>
                                           <a:rPr lang="en-US" sz="1100">
                                             <a:effectLst/>
+                                            <a:latin typeface="Cambria Math" panose="02040503050406030204" pitchFamily="18" charset="0"/>
                                           </a:rPr>
                                           <m:t>1−</m:t>
                                         </m:r>
                                         <m:sSup>
                                           <m:sSupPr>
                                             <m:ctrlPr>
-                                              <a:rPr lang="en-CA" sz="1100">
+                                              <a:rPr lang="en-CA" sz="1100" i="1">
                                                 <a:effectLst/>
+                                                <a:latin typeface="Cambria Math" panose="02040503050406030204" pitchFamily="18" charset="0"/>
                                               </a:rPr>
                                             </m:ctrlPr>
                                           </m:sSupPr>
@@ -6209,6 +6226,7 @@
                                             <m:r>
                                               <a:rPr lang="en-US" sz="1100">
                                                 <a:effectLst/>
+                                                <a:latin typeface="Cambria Math" panose="02040503050406030204" pitchFamily="18" charset="0"/>
                                               </a:rPr>
                                               <m:t>𝑒</m:t>
                                             </m:r>
@@ -6217,14 +6235,16 @@
                                             <m:r>
                                               <a:rPr lang="en-US" sz="1100">
                                                 <a:effectLst/>
+                                                <a:latin typeface="Cambria Math" panose="02040503050406030204" pitchFamily="18" charset="0"/>
                                               </a:rPr>
                                               <m:t>−</m:t>
                                             </m:r>
                                             <m:f>
                                               <m:fPr>
                                                 <m:ctrlPr>
-                                                  <a:rPr lang="en-CA" sz="1100">
+                                                  <a:rPr lang="en-CA" sz="1100" i="1">
                                                     <a:effectLst/>
+                                                    <a:latin typeface="Cambria Math" panose="02040503050406030204" pitchFamily="18" charset="0"/>
                                                   </a:rPr>
                                                 </m:ctrlPr>
                                               </m:fPr>
@@ -6232,6 +6252,7 @@
                                                 <m:r>
                                                   <a:rPr lang="en-US" sz="1100">
                                                     <a:effectLst/>
+                                                    <a:latin typeface="Cambria Math" panose="02040503050406030204" pitchFamily="18" charset="0"/>
                                                   </a:rPr>
                                                   <m:t>𝑡</m:t>
                                                 </m:r>
@@ -6240,6 +6261,7 @@
                                                 <m:r>
                                                   <a:rPr lang="en-US" sz="1100">
                                                     <a:effectLst/>
+                                                    <a:latin typeface="Cambria Math" panose="02040503050406030204" pitchFamily="18" charset="0"/>
                                                   </a:rPr>
                                                   <m:t>𝜏</m:t>
                                                 </m:r>
@@ -6254,14 +6276,16 @@
                                 <m:r>
                                   <a:rPr lang="en-US" sz="1100">
                                     <a:effectLst/>
+                                    <a:latin typeface="Cambria Math" panose="02040503050406030204" pitchFamily="18" charset="0"/>
                                   </a:rPr>
                                   <m:t>=</m:t>
                                 </m:r>
                                 <m:f>
                                   <m:fPr>
                                     <m:ctrlPr>
-                                      <a:rPr lang="en-CA" sz="1100">
+                                      <a:rPr lang="en-CA" sz="1100" i="1">
                                         <a:effectLst/>
+                                        <a:latin typeface="Cambria Math" panose="02040503050406030204" pitchFamily="18" charset="0"/>
                                       </a:rPr>
                                     </m:ctrlPr>
                                   </m:fPr>
@@ -6269,6 +6293,7 @@
                                     <m:r>
                                       <a:rPr lang="en-US" sz="1100">
                                         <a:effectLst/>
+                                        <a:latin typeface="Cambria Math" panose="02040503050406030204" pitchFamily="18" charset="0"/>
                                       </a:rPr>
                                       <m:t>1</m:t>
                                     </m:r>
@@ -6277,6 +6302,7 @@
                                     <m:r>
                                       <a:rPr lang="en-US" sz="1100">
                                         <a:effectLst/>
+                                        <a:latin typeface="Cambria Math" panose="02040503050406030204" pitchFamily="18" charset="0"/>
                                       </a:rPr>
                                       <m:t>2</m:t>
                                     </m:r>
@@ -6285,8 +6311,9 @@
                                 <m:sSub>
                                   <m:sSubPr>
                                     <m:ctrlPr>
-                                      <a:rPr lang="en-CA" sz="1100">
+                                      <a:rPr lang="en-CA" sz="1100" i="1">
                                         <a:effectLst/>
+                                        <a:latin typeface="Cambria Math" panose="02040503050406030204" pitchFamily="18" charset="0"/>
                                       </a:rPr>
                                     </m:ctrlPr>
                                   </m:sSubPr>
@@ -6294,6 +6321,7 @@
                                     <m:r>
                                       <a:rPr lang="en-US" sz="1100">
                                         <a:effectLst/>
+                                        <a:latin typeface="Cambria Math" panose="02040503050406030204" pitchFamily="18" charset="0"/>
                                       </a:rPr>
                                       <m:t>𝑐</m:t>
                                     </m:r>
@@ -6302,6 +6330,7 @@
                                     <m:r>
                                       <a:rPr lang="en-US" sz="1100">
                                         <a:effectLst/>
+                                        <a:latin typeface="Cambria Math" panose="02040503050406030204" pitchFamily="18" charset="0"/>
                                       </a:rPr>
                                       <m:t>𝑖</m:t>
                                     </m:r>
@@ -6312,8 +6341,9 @@
                                     <m:begChr m:val="["/>
                                     <m:endChr m:val="]"/>
                                     <m:ctrlPr>
-                                      <a:rPr lang="en-CA" sz="1100">
+                                      <a:rPr lang="en-CA" sz="1100" i="1">
                                         <a:effectLst/>
+                                        <a:latin typeface="Cambria Math" panose="02040503050406030204" pitchFamily="18" charset="0"/>
                                       </a:rPr>
                                     </m:ctrlPr>
                                   </m:dPr>
@@ -6321,8 +6351,9 @@
                                     <m:d>
                                       <m:dPr>
                                         <m:ctrlPr>
-                                          <a:rPr lang="en-CA" sz="1100">
+                                          <a:rPr lang="en-CA" sz="1100" i="1">
                                             <a:effectLst/>
+                                            <a:latin typeface="Cambria Math" panose="02040503050406030204" pitchFamily="18" charset="0"/>
                                           </a:rPr>
                                         </m:ctrlPr>
                                       </m:dPr>
@@ -6330,14 +6361,16 @@
                                         <m:r>
                                           <a:rPr lang="en-US" sz="1100">
                                             <a:effectLst/>
+                                            <a:latin typeface="Cambria Math" panose="02040503050406030204" pitchFamily="18" charset="0"/>
                                           </a:rPr>
                                           <m:t>1+</m:t>
                                         </m:r>
                                         <m:func>
                                           <m:funcPr>
                                             <m:ctrlPr>
-                                              <a:rPr lang="en-CA" sz="1100">
+                                              <a:rPr lang="en-CA" sz="1100" i="1">
                                                 <a:effectLst/>
+                                                <a:latin typeface="Cambria Math" panose="02040503050406030204" pitchFamily="18" charset="0"/>
                                               </a:rPr>
                                             </m:ctrlPr>
                                           </m:funcPr>
@@ -6348,6 +6381,7 @@
                                               </m:rPr>
                                               <a:rPr lang="en-US" sz="1100">
                                                 <a:effectLst/>
+                                                <a:latin typeface="Cambria Math" panose="02040503050406030204" pitchFamily="18" charset="0"/>
                                               </a:rPr>
                                               <m:t>erf</m:t>
                                             </m:r>
@@ -6356,8 +6390,9 @@
                                             <m:d>
                                               <m:dPr>
                                                 <m:ctrlPr>
-                                                  <a:rPr lang="en-CA" sz="1100">
+                                                  <a:rPr lang="en-CA" sz="1100" i="1">
                                                     <a:effectLst/>
+                                                    <a:latin typeface="Cambria Math" panose="02040503050406030204" pitchFamily="18" charset="0"/>
                                                   </a:rPr>
                                                 </m:ctrlPr>
                                               </m:dPr>
@@ -6365,8 +6400,9 @@
                                                 <m:f>
                                                   <m:fPr>
                                                     <m:ctrlPr>
-                                                      <a:rPr lang="en-CA" sz="1100">
+                                                      <a:rPr lang="en-CA" sz="1100" i="1">
                                                         <a:effectLst/>
+                                                        <a:latin typeface="Cambria Math" panose="02040503050406030204" pitchFamily="18" charset="0"/>
                                                       </a:rPr>
                                                     </m:ctrlPr>
                                                   </m:fPr>
@@ -6374,6 +6410,7 @@
                                                     <m:r>
                                                       <a:rPr lang="en-US" sz="1100">
                                                         <a:effectLst/>
+                                                        <a:latin typeface="Cambria Math" panose="02040503050406030204" pitchFamily="18" charset="0"/>
                                                       </a:rPr>
                                                       <m:t>𝑡</m:t>
                                                     </m:r>
@@ -6383,8 +6420,9 @@
                                                       <m:radPr>
                                                         <m:degHide m:val="on"/>
                                                         <m:ctrlPr>
-                                                          <a:rPr lang="en-CA" sz="1100">
+                                                          <a:rPr lang="en-CA" sz="1100" i="1">
                                                             <a:effectLst/>
+                                                            <a:latin typeface="Cambria Math" panose="02040503050406030204" pitchFamily="18" charset="0"/>
                                                           </a:rPr>
                                                         </m:ctrlPr>
                                                       </m:radPr>
@@ -6393,6 +6431,7 @@
                                                         <m:r>
                                                           <a:rPr lang="en-US" sz="1100">
                                                             <a:effectLst/>
+                                                            <a:latin typeface="Cambria Math" panose="02040503050406030204" pitchFamily="18" charset="0"/>
                                                           </a:rPr>
                                                           <m:t>2</m:t>
                                                         </m:r>
@@ -6401,6 +6440,7 @@
                                                     <m:r>
                                                       <a:rPr lang="en-US" sz="1100">
                                                         <a:effectLst/>
+                                                        <a:latin typeface="Cambria Math" panose="02040503050406030204" pitchFamily="18" charset="0"/>
                                                       </a:rPr>
                                                       <m:t>𝜎</m:t>
                                                     </m:r>
@@ -6415,14 +6455,16 @@
                                     <m:r>
                                       <a:rPr lang="en-US" sz="1100">
                                         <a:effectLst/>
+                                        <a:latin typeface="Cambria Math" panose="02040503050406030204" pitchFamily="18" charset="0"/>
                                       </a:rPr>
                                       <m:t>−</m:t>
                                     </m:r>
                                     <m:sSup>
                                       <m:sSupPr>
                                         <m:ctrlPr>
-                                          <a:rPr lang="en-CA" sz="1100">
+                                          <a:rPr lang="en-CA" sz="1100" i="1">
                                             <a:effectLst/>
+                                            <a:latin typeface="Cambria Math" panose="02040503050406030204" pitchFamily="18" charset="0"/>
                                           </a:rPr>
                                         </m:ctrlPr>
                                       </m:sSupPr>
@@ -6430,6 +6472,7 @@
                                         <m:r>
                                           <a:rPr lang="en-US" sz="1100">
                                             <a:effectLst/>
+                                            <a:latin typeface="Cambria Math" panose="02040503050406030204" pitchFamily="18" charset="0"/>
                                           </a:rPr>
                                           <m:t>𝑒</m:t>
                                         </m:r>
@@ -6438,8 +6481,9 @@
                                         <m:f>
                                           <m:fPr>
                                             <m:ctrlPr>
-                                              <a:rPr lang="en-CA" sz="1100">
+                                              <a:rPr lang="en-CA" sz="1100" i="1">
                                                 <a:effectLst/>
+                                                <a:latin typeface="Cambria Math" panose="02040503050406030204" pitchFamily="18" charset="0"/>
                                               </a:rPr>
                                             </m:ctrlPr>
                                           </m:fPr>
@@ -6447,12 +6491,14 @@
                                             <m:r>
                                               <a:rPr lang="en-US" sz="1100">
                                                 <a:effectLst/>
+                                                <a:latin typeface="Cambria Math" panose="02040503050406030204" pitchFamily="18" charset="0"/>
                                               </a:rPr>
                                               <m:t>−</m:t>
                                             </m:r>
                                             <m:r>
                                               <a:rPr lang="en-US" sz="1100">
                                                 <a:effectLst/>
+                                                <a:latin typeface="Cambria Math" panose="02040503050406030204" pitchFamily="18" charset="0"/>
                                               </a:rPr>
                                               <m:t>𝑡</m:t>
                                             </m:r>
@@ -6461,6 +6507,7 @@
                                             <m:r>
                                               <a:rPr lang="en-US" sz="1100">
                                                 <a:effectLst/>
+                                                <a:latin typeface="Cambria Math" panose="02040503050406030204" pitchFamily="18" charset="0"/>
                                               </a:rPr>
                                               <m:t>𝜏</m:t>
                                             </m:r>
@@ -6471,8 +6518,9 @@
                                     <m:sSup>
                                       <m:sSupPr>
                                         <m:ctrlPr>
-                                          <a:rPr lang="en-CA" sz="1100">
+                                          <a:rPr lang="en-CA" sz="1100" i="1">
                                             <a:effectLst/>
+                                            <a:latin typeface="Cambria Math" panose="02040503050406030204" pitchFamily="18" charset="0"/>
                                           </a:rPr>
                                         </m:ctrlPr>
                                       </m:sSupPr>
@@ -6480,6 +6528,7 @@
                                         <m:r>
                                           <a:rPr lang="en-US" sz="1100">
                                             <a:effectLst/>
+                                            <a:latin typeface="Cambria Math" panose="02040503050406030204" pitchFamily="18" charset="0"/>
                                           </a:rPr>
                                           <m:t>𝑒</m:t>
                                         </m:r>
@@ -6488,8 +6537,9 @@
                                         <m:f>
                                           <m:fPr>
                                             <m:ctrlPr>
-                                              <a:rPr lang="en-CA" sz="1100">
+                                              <a:rPr lang="en-CA" sz="1100" i="1">
                                                 <a:effectLst/>
+                                                <a:latin typeface="Cambria Math" panose="02040503050406030204" pitchFamily="18" charset="0"/>
                                               </a:rPr>
                                             </m:ctrlPr>
                                           </m:fPr>
@@ -6497,6 +6547,7 @@
                                             <m:r>
                                               <a:rPr lang="en-US" sz="1100">
                                                 <a:effectLst/>
+                                                <a:latin typeface="Cambria Math" panose="02040503050406030204" pitchFamily="18" charset="0"/>
                                               </a:rPr>
                                               <m:t>1</m:t>
                                             </m:r>
@@ -6505,6 +6556,7 @@
                                             <m:r>
                                               <a:rPr lang="en-US" sz="1100">
                                                 <a:effectLst/>
+                                                <a:latin typeface="Cambria Math" panose="02040503050406030204" pitchFamily="18" charset="0"/>
                                               </a:rPr>
                                               <m:t>2</m:t>
                                             </m:r>
@@ -6513,8 +6565,9 @@
                                         <m:sSup>
                                           <m:sSupPr>
                                             <m:ctrlPr>
-                                              <a:rPr lang="en-CA" sz="1100">
+                                              <a:rPr lang="en-CA" sz="1100" i="1">
                                                 <a:effectLst/>
+                                                <a:latin typeface="Cambria Math" panose="02040503050406030204" pitchFamily="18" charset="0"/>
                                               </a:rPr>
                                             </m:ctrlPr>
                                           </m:sSupPr>
@@ -6522,8 +6575,9 @@
                                             <m:d>
                                               <m:dPr>
                                                 <m:ctrlPr>
-                                                  <a:rPr lang="en-CA" sz="1100">
+                                                  <a:rPr lang="en-CA" sz="1100" i="1">
                                                     <a:effectLst/>
+                                                    <a:latin typeface="Cambria Math" panose="02040503050406030204" pitchFamily="18" charset="0"/>
                                                   </a:rPr>
                                                 </m:ctrlPr>
                                               </m:dPr>
@@ -6531,8 +6585,9 @@
                                                 <m:f>
                                                   <m:fPr>
                                                     <m:ctrlPr>
-                                                      <a:rPr lang="en-CA" sz="1100">
+                                                      <a:rPr lang="en-CA" sz="1100" i="1">
                                                         <a:effectLst/>
+                                                        <a:latin typeface="Cambria Math" panose="02040503050406030204" pitchFamily="18" charset="0"/>
                                                       </a:rPr>
                                                     </m:ctrlPr>
                                                   </m:fPr>
@@ -6540,6 +6595,7 @@
                                                     <m:r>
                                                       <a:rPr lang="en-US" sz="1100">
                                                         <a:effectLst/>
+                                                        <a:latin typeface="Cambria Math" panose="02040503050406030204" pitchFamily="18" charset="0"/>
                                                       </a:rPr>
                                                       <m:t>𝜎</m:t>
                                                     </m:r>
@@ -6548,6 +6604,7 @@
                                                     <m:r>
                                                       <a:rPr lang="en-US" sz="1100">
                                                         <a:effectLst/>
+                                                        <a:latin typeface="Cambria Math" panose="02040503050406030204" pitchFamily="18" charset="0"/>
                                                       </a:rPr>
                                                       <m:t>𝜏</m:t>
                                                     </m:r>
@@ -6560,6 +6617,7 @@
                                             <m:r>
                                               <a:rPr lang="en-US" sz="1100">
                                                 <a:effectLst/>
+                                                <a:latin typeface="Cambria Math" panose="02040503050406030204" pitchFamily="18" charset="0"/>
                                               </a:rPr>
                                               <m:t>2</m:t>
                                             </m:r>
@@ -6570,8 +6628,9 @@
                                     <m:d>
                                       <m:dPr>
                                         <m:ctrlPr>
-                                          <a:rPr lang="en-CA" sz="1100">
+                                          <a:rPr lang="en-CA" sz="1100" i="1">
                                             <a:effectLst/>
+                                            <a:latin typeface="Cambria Math" panose="02040503050406030204" pitchFamily="18" charset="0"/>
                                           </a:rPr>
                                         </m:ctrlPr>
                                       </m:dPr>
@@ -6579,14 +6638,16 @@
                                         <m:r>
                                           <a:rPr lang="en-US" sz="1100">
                                             <a:effectLst/>
+                                            <a:latin typeface="Cambria Math" panose="02040503050406030204" pitchFamily="18" charset="0"/>
                                           </a:rPr>
                                           <m:t>1+</m:t>
                                         </m:r>
                                         <m:func>
                                           <m:funcPr>
                                             <m:ctrlPr>
-                                              <a:rPr lang="en-CA" sz="1100">
+                                              <a:rPr lang="en-CA" sz="1100" i="1">
                                                 <a:effectLst/>
+                                                <a:latin typeface="Cambria Math" panose="02040503050406030204" pitchFamily="18" charset="0"/>
                                               </a:rPr>
                                             </m:ctrlPr>
                                           </m:funcPr>
@@ -6597,6 +6658,7 @@
                                               </m:rPr>
                                               <a:rPr lang="en-US" sz="1100">
                                                 <a:effectLst/>
+                                                <a:latin typeface="Cambria Math" panose="02040503050406030204" pitchFamily="18" charset="0"/>
                                               </a:rPr>
                                               <m:t>erf</m:t>
                                             </m:r>
@@ -6605,8 +6667,9 @@
                                             <m:d>
                                               <m:dPr>
                                                 <m:ctrlPr>
-                                                  <a:rPr lang="en-CA" sz="1100">
+                                                  <a:rPr lang="en-CA" sz="1100" i="1">
                                                     <a:effectLst/>
+                                                    <a:latin typeface="Cambria Math" panose="02040503050406030204" pitchFamily="18" charset="0"/>
                                                   </a:rPr>
                                                 </m:ctrlPr>
                                               </m:dPr>
@@ -6614,8 +6677,9 @@
                                                 <m:f>
                                                   <m:fPr>
                                                     <m:ctrlPr>
-                                                      <a:rPr lang="en-CA" sz="1100">
+                                                      <a:rPr lang="en-CA" sz="1100" i="1">
                                                         <a:effectLst/>
+                                                        <a:latin typeface="Cambria Math" panose="02040503050406030204" pitchFamily="18" charset="0"/>
                                                       </a:rPr>
                                                     </m:ctrlPr>
                                                   </m:fPr>
@@ -6623,20 +6687,23 @@
                                                     <m:r>
                                                       <a:rPr lang="en-US" sz="1100">
                                                         <a:effectLst/>
+                                                        <a:latin typeface="Cambria Math" panose="02040503050406030204" pitchFamily="18" charset="0"/>
                                                       </a:rPr>
                                                       <m:t>𝑡</m:t>
                                                     </m:r>
                                                     <m:r>
                                                       <a:rPr lang="en-US" sz="1100">
                                                         <a:effectLst/>
+                                                        <a:latin typeface="Cambria Math" panose="02040503050406030204" pitchFamily="18" charset="0"/>
                                                       </a:rPr>
                                                       <m:t>−</m:t>
                                                     </m:r>
                                                     <m:f>
                                                       <m:fPr>
                                                         <m:ctrlPr>
-                                                          <a:rPr lang="en-CA" sz="1100">
+                                                          <a:rPr lang="en-CA" sz="1100" i="1">
                                                             <a:effectLst/>
+                                                            <a:latin typeface="Cambria Math" panose="02040503050406030204" pitchFamily="18" charset="0"/>
                                                           </a:rPr>
                                                         </m:ctrlPr>
                                                       </m:fPr>
@@ -6644,8 +6711,9 @@
                                                         <m:sSup>
                                                           <m:sSupPr>
                                                             <m:ctrlPr>
-                                                              <a:rPr lang="en-CA" sz="1100">
+                                                              <a:rPr lang="en-CA" sz="1100" i="1">
                                                                 <a:effectLst/>
+                                                                <a:latin typeface="Cambria Math" panose="02040503050406030204" pitchFamily="18" charset="0"/>
                                                               </a:rPr>
                                                             </m:ctrlPr>
                                                           </m:sSupPr>
@@ -6653,6 +6721,7 @@
                                                             <m:r>
                                                               <a:rPr lang="en-US" sz="1100">
                                                                 <a:effectLst/>
+                                                                <a:latin typeface="Cambria Math" panose="02040503050406030204" pitchFamily="18" charset="0"/>
                                                               </a:rPr>
                                                               <m:t>𝜎</m:t>
                                                             </m:r>
@@ -6661,6 +6730,7 @@
                                                             <m:r>
                                                               <a:rPr lang="en-US" sz="1100">
                                                                 <a:effectLst/>
+                                                                <a:latin typeface="Cambria Math" panose="02040503050406030204" pitchFamily="18" charset="0"/>
                                                               </a:rPr>
                                                               <m:t>2</m:t>
                                                             </m:r>
@@ -6671,6 +6741,7 @@
                                                         <m:r>
                                                           <a:rPr lang="en-US" sz="1100">
                                                             <a:effectLst/>
+                                                            <a:latin typeface="Cambria Math" panose="02040503050406030204" pitchFamily="18" charset="0"/>
                                                           </a:rPr>
                                                           <m:t>𝑡</m:t>
                                                         </m:r>
@@ -6682,8 +6753,9 @@
                                                       <m:radPr>
                                                         <m:degHide m:val="on"/>
                                                         <m:ctrlPr>
-                                                          <a:rPr lang="en-CA" sz="1100">
+                                                          <a:rPr lang="en-CA" sz="1100" i="1">
                                                             <a:effectLst/>
+                                                            <a:latin typeface="Cambria Math" panose="02040503050406030204" pitchFamily="18" charset="0"/>
                                                           </a:rPr>
                                                         </m:ctrlPr>
                                                       </m:radPr>
@@ -6692,6 +6764,7 @@
                                                         <m:r>
                                                           <a:rPr lang="en-US" sz="1100">
                                                             <a:effectLst/>
+                                                            <a:latin typeface="Cambria Math" panose="02040503050406030204" pitchFamily="18" charset="0"/>
                                                           </a:rPr>
                                                           <m:t>2</m:t>
                                                         </m:r>
@@ -6700,6 +6773,7 @@
                                                     <m:r>
                                                       <a:rPr lang="en-US" sz="1100">
                                                         <a:effectLst/>
+                                                        <a:latin typeface="Cambria Math" panose="02040503050406030204" pitchFamily="18" charset="0"/>
                                                       </a:rPr>
                                                       <m:t>𝜎</m:t>
                                                     </m:r>
@@ -6716,6 +6790,7 @@
                                 <m:r>
                                   <a:rPr lang="en-US" sz="1100">
                                     <a:effectLst/>
+                                    <a:latin typeface="Cambria Math" panose="02040503050406030204" pitchFamily="18" charset="0"/>
                                   </a:rPr>
                                   <m:t>  </m:t>
                                 </m:r>
@@ -6743,7 +6818,7 @@
             </a:graphic>
           </p:graphicFrame>
         </mc:Choice>
-        <mc:Fallback>
+        <mc:Fallback xmlns="">
           <p:graphicFrame>
             <p:nvGraphicFramePr>
               <p:cNvPr id="13" name="Table 12">
@@ -6848,8 +6923,8 @@
           </a:p>
         </p:txBody>
       </p:sp>
-      <mc:AlternateContent xmlns:mc="http://schemas.openxmlformats.org/markup-compatibility/2006">
-        <mc:Choice xmlns:a14="http://schemas.microsoft.com/office/drawing/2010/main" Requires="a14">
+      <mc:AlternateContent xmlns:mc="http://schemas.openxmlformats.org/markup-compatibility/2006" xmlns:a14="http://schemas.microsoft.com/office/drawing/2010/main">
+        <mc:Choice Requires="a14">
           <p:sp>
             <p:nvSpPr>
               <p:cNvPr id="15" name="TextBox 14">
@@ -6909,7 +6984,7 @@
             </p:txBody>
           </p:sp>
         </mc:Choice>
-        <mc:Fallback>
+        <mc:Fallback xmlns="">
           <p:sp>
             <p:nvSpPr>
               <p:cNvPr id="15" name="TextBox 14">

</xml_diff>